<commit_message>
Paar aanpassingen om opmaak consequent te maken
</commit_message>
<xml_diff>
--- a/eindpresentatie.pptx
+++ b/eindpresentatie.pptx
@@ -123,7 +123,7 @@
   </p:defaultTextStyle>
   <p:extLst>
     <p:ext uri="{EFAFB233-063F-42B5-8137-9DF3F51BA10A}">
-      <p15:sldGuideLst xmlns:p15="http://schemas.microsoft.com/office/powerpoint/2012/main">
+      <p15:sldGuideLst xmlns:p15="http://schemas.microsoft.com/office/powerpoint/2012/main" xmlns="">
         <p15:guide id="1" orient="horz" pos="2160">
           <p15:clr>
             <a:srgbClr val="A4A3A4"/>
@@ -141,7 +141,7 @@
 </file>
 
 <file path=ppt/charts/chart1.xml><?xml version="1.0" encoding="utf-8"?>
-<c:chartSpace xmlns:c="http://schemas.openxmlformats.org/drawingml/2006/chart" xmlns:a="http://schemas.openxmlformats.org/drawingml/2006/main" xmlns:r="http://schemas.openxmlformats.org/officeDocument/2006/relationships" xmlns:c16r2="http://schemas.microsoft.com/office/drawing/2015/06/chart">
+<c:chartSpace xmlns:c="http://schemas.openxmlformats.org/drawingml/2006/chart" xmlns:a="http://schemas.openxmlformats.org/drawingml/2006/main" xmlns:r="http://schemas.openxmlformats.org/officeDocument/2006/relationships">
   <c:date1904 val="0"/>
   <c:lang val="nl-NL"/>
   <c:roundedCorners val="0"/>
@@ -192,8 +192,8 @@
         <c:manualLayout>
           <c:xMode val="edge"/>
           <c:yMode val="edge"/>
-          <c:x val="0.32478193650451226"/>
-          <c:y val="0"/>
+          <c:x val="0.324781936504512"/>
+          <c:y val="0.0"/>
         </c:manualLayout>
       </c:layout>
       <c:overlay val="0"/>
@@ -245,7 +245,7 @@
             <c:showPercent val="0"/>
             <c:showBubbleSize val="0"/>
             <c:showLeaderLines val="0"/>
-            <c:extLst>
+            <c:extLst xmlns:c16r2="http://schemas.microsoft.com/office/drawing/2015/06/chart">
               <c:ext xmlns:c15="http://schemas.microsoft.com/office/drawing/2012/chart" uri="{CE6537A1-D6FC-4f65-9D91-7224C49458BB}">
                 <c15:showLeaderLines val="0"/>
               </c:ext>
@@ -278,21 +278,21 @@
                 <c:formatCode>0</c:formatCode>
                 <c:ptCount val="4"/>
                 <c:pt idx="0">
-                  <c:v>499</c:v>
+                  <c:v>499.0</c:v>
                 </c:pt>
                 <c:pt idx="1">
-                  <c:v>92</c:v>
+                  <c:v>92.0</c:v>
                 </c:pt>
                 <c:pt idx="2">
-                  <c:v>2</c:v>
+                  <c:v>2.0</c:v>
                 </c:pt>
                 <c:pt idx="3">
-                  <c:v>0</c:v>
+                  <c:v>0.0</c:v>
                 </c:pt>
               </c:numCache>
             </c:numRef>
           </c:val>
-          <c:extLst>
+          <c:extLst xmlns:c16r2="http://schemas.microsoft.com/office/drawing/2015/06/chart">
             <c:ext xmlns:c16="http://schemas.microsoft.com/office/drawing/2014/chart" uri="{C3380CC4-5D6E-409C-BE32-E72D297353CC}">
               <c16:uniqueId val="{00000000-F949-4671-AD9F-1FE391B89D59}"/>
             </c:ext>
@@ -338,7 +338,7 @@
             <c:showPercent val="0"/>
             <c:showBubbleSize val="0"/>
             <c:showLeaderLines val="0"/>
-            <c:extLst>
+            <c:extLst xmlns:c16r2="http://schemas.microsoft.com/office/drawing/2015/06/chart">
               <c:ext xmlns:c15="http://schemas.microsoft.com/office/drawing/2012/chart" uri="{CE6537A1-D6FC-4f65-9D91-7224C49458BB}">
                 <c15:showLeaderLines val="0"/>
               </c:ext>
@@ -371,21 +371,21 @@
                 <c:formatCode>0</c:formatCode>
                 <c:ptCount val="4"/>
                 <c:pt idx="0">
-                  <c:v>2457</c:v>
+                  <c:v>2457.0</c:v>
                 </c:pt>
                 <c:pt idx="1">
-                  <c:v>2844</c:v>
+                  <c:v>2844.0</c:v>
                 </c:pt>
                 <c:pt idx="2">
-                  <c:v>397</c:v>
+                  <c:v>397.0</c:v>
                 </c:pt>
                 <c:pt idx="3">
-                  <c:v>37</c:v>
+                  <c:v>37.0</c:v>
                 </c:pt>
               </c:numCache>
             </c:numRef>
           </c:val>
-          <c:extLst>
+          <c:extLst xmlns:c16r2="http://schemas.microsoft.com/office/drawing/2015/06/chart">
             <c:ext xmlns:c16="http://schemas.microsoft.com/office/drawing/2014/chart" uri="{C3380CC4-5D6E-409C-BE32-E72D297353CC}">
               <c16:uniqueId val="{00000001-F949-4671-AD9F-1FE391B89D59}"/>
             </c:ext>
@@ -431,7 +431,7 @@
             <c:showPercent val="0"/>
             <c:showBubbleSize val="0"/>
             <c:showLeaderLines val="0"/>
-            <c:extLst>
+            <c:extLst xmlns:c16r2="http://schemas.microsoft.com/office/drawing/2015/06/chart">
               <c:ext xmlns:c15="http://schemas.microsoft.com/office/drawing/2012/chart" uri="{CE6537A1-D6FC-4f65-9D91-7224C49458BB}">
                 <c15:showLeaderLines val="0"/>
               </c:ext>
@@ -464,21 +464,21 @@
                 <c:formatCode>0</c:formatCode>
                 <c:ptCount val="4"/>
                 <c:pt idx="0">
-                  <c:v>42</c:v>
+                  <c:v>42.0</c:v>
                 </c:pt>
                 <c:pt idx="1">
-                  <c:v>10</c:v>
+                  <c:v>10.0</c:v>
                 </c:pt>
                 <c:pt idx="2">
-                  <c:v>0</c:v>
+                  <c:v>0.0</c:v>
                 </c:pt>
                 <c:pt idx="3">
-                  <c:v>0</c:v>
+                  <c:v>0.0</c:v>
                 </c:pt>
               </c:numCache>
             </c:numRef>
           </c:val>
-          <c:extLst>
+          <c:extLst xmlns:c16r2="http://schemas.microsoft.com/office/drawing/2015/06/chart">
             <c:ext xmlns:c16="http://schemas.microsoft.com/office/drawing/2014/chart" uri="{C3380CC4-5D6E-409C-BE32-E72D297353CC}">
               <c16:uniqueId val="{00000002-F949-4671-AD9F-1FE391B89D59}"/>
             </c:ext>
@@ -493,11 +493,11 @@
           <c:showBubbleSize val="0"/>
         </c:dLbls>
         <c:gapWidth val="150"/>
-        <c:axId val="288539440"/>
-        <c:axId val="288541008"/>
+        <c:axId val="2127332792"/>
+        <c:axId val="2127335944"/>
       </c:barChart>
       <c:catAx>
-        <c:axId val="288539440"/>
+        <c:axId val="2127332792"/>
         <c:scaling>
           <c:orientation val="minMax"/>
         </c:scaling>
@@ -517,7 +517,7 @@
             <a:endParaRPr lang="nl-NL"/>
           </a:p>
         </c:txPr>
-        <c:crossAx val="288541008"/>
+        <c:crossAx val="2127335944"/>
         <c:crosses val="autoZero"/>
         <c:auto val="1"/>
         <c:lblAlgn val="ctr"/>
@@ -525,7 +525,7 @@
         <c:noMultiLvlLbl val="0"/>
       </c:catAx>
       <c:valAx>
-        <c:axId val="288541008"/>
+        <c:axId val="2127335944"/>
         <c:scaling>
           <c:orientation val="minMax"/>
         </c:scaling>
@@ -548,19 +548,21 @@
               </a:p>
             </c:rich>
           </c:tx>
+          <c:layout/>
           <c:overlay val="0"/>
         </c:title>
         <c:numFmt formatCode="0" sourceLinked="1"/>
         <c:majorTickMark val="out"/>
         <c:minorTickMark val="none"/>
         <c:tickLblPos val="nextTo"/>
-        <c:crossAx val="288539440"/>
+        <c:crossAx val="2127332792"/>
         <c:crosses val="autoZero"/>
         <c:crossBetween val="between"/>
       </c:valAx>
     </c:plotArea>
     <c:legend>
       <c:legendPos val="r"/>
+      <c:layout/>
       <c:overlay val="0"/>
       <c:txPr>
         <a:bodyPr/>
@@ -584,7 +586,7 @@
 </file>
 
 <file path=ppt/charts/chart2.xml><?xml version="1.0" encoding="utf-8"?>
-<c:chartSpace xmlns:c="http://schemas.openxmlformats.org/drawingml/2006/chart" xmlns:a="http://schemas.openxmlformats.org/drawingml/2006/main" xmlns:r="http://schemas.openxmlformats.org/officeDocument/2006/relationships" xmlns:c16r2="http://schemas.microsoft.com/office/drawing/2015/06/chart">
+<c:chartSpace xmlns:c="http://schemas.openxmlformats.org/drawingml/2006/chart" xmlns:a="http://schemas.openxmlformats.org/drawingml/2006/main" xmlns:r="http://schemas.openxmlformats.org/officeDocument/2006/relationships">
   <c:date1904 val="1"/>
   <c:lang val="nl-NL"/>
   <c:roundedCorners val="0"/>
@@ -617,8 +619,8 @@
         <c:manualLayout>
           <c:xMode val="edge"/>
           <c:yMode val="edge"/>
-          <c:x val="0.16517947455922699"/>
-          <c:y val="0"/>
+          <c:x val="0.165179474559227"/>
+          <c:y val="0.0"/>
         </c:manualLayout>
       </c:layout>
       <c:overlay val="0"/>
@@ -650,8 +652,8 @@
               <c:idx val="0"/>
               <c:layout>
                 <c:manualLayout>
-                  <c:x val="-1.4856662518272899E-17"/>
-                  <c:y val="9.2378752886835992E-3"/>
+                  <c:x val="-1.48566625182729E-17"/>
+                  <c:y val="0.0092378752886836"/>
                 </c:manualLayout>
               </c:layout>
               <c:showLegendKey val="0"/>
@@ -660,7 +662,7 @@
               <c:showSerName val="0"/>
               <c:showPercent val="0"/>
               <c:showBubbleSize val="0"/>
-              <c:extLst>
+              <c:extLst xmlns:c16r2="http://schemas.microsoft.com/office/drawing/2015/06/chart">
                 <c:ext xmlns:c15="http://schemas.microsoft.com/office/drawing/2012/chart" uri="{CE6537A1-D6FC-4f65-9D91-7224C49458BB}"/>
                 <c:ext xmlns:c16="http://schemas.microsoft.com/office/drawing/2014/chart" uri="{C3380CC4-5D6E-409C-BE32-E72D297353CC}">
                   <c16:uniqueId val="{00000000-2C3D-4126-A442-3DDF71414ABF}"/>
@@ -671,8 +673,8 @@
               <c:idx val="1"/>
               <c:layout>
                 <c:manualLayout>
-                  <c:x val="-2.9713325036545799E-17"/>
-                  <c:y val="-1.15473441108545E-2"/>
+                  <c:x val="-2.97133250365458E-17"/>
+                  <c:y val="-0.0115473441108545"/>
                 </c:manualLayout>
               </c:layout>
               <c:showLegendKey val="0"/>
@@ -681,7 +683,7 @@
               <c:showSerName val="0"/>
               <c:showPercent val="0"/>
               <c:showBubbleSize val="0"/>
-              <c:extLst>
+              <c:extLst xmlns:c16r2="http://schemas.microsoft.com/office/drawing/2015/06/chart">
                 <c:ext xmlns:c15="http://schemas.microsoft.com/office/drawing/2012/chart" uri="{CE6537A1-D6FC-4f65-9D91-7224C49458BB}"/>
                 <c:ext xmlns:c16="http://schemas.microsoft.com/office/drawing/2014/chart" uri="{C3380CC4-5D6E-409C-BE32-E72D297353CC}">
                   <c16:uniqueId val="{00000001-2C3D-4126-A442-3DDF71414ABF}"/>
@@ -712,7 +714,7 @@
             <c:showPercent val="0"/>
             <c:showBubbleSize val="0"/>
             <c:showLeaderLines val="0"/>
-            <c:extLst>
+            <c:extLst xmlns:c16r2="http://schemas.microsoft.com/office/drawing/2015/06/chart">
               <c:ext xmlns:c15="http://schemas.microsoft.com/office/drawing/2012/chart" uri="{CE6537A1-D6FC-4f65-9D91-7224C49458BB}">
                 <c15:showLeaderLines val="0"/>
               </c:ext>
@@ -745,21 +747,21 @@
                 <c:formatCode>General</c:formatCode>
                 <c:ptCount val="4"/>
                 <c:pt idx="0">
-                  <c:v>1128</c:v>
+                  <c:v>1128.0</c:v>
                 </c:pt>
                 <c:pt idx="1">
-                  <c:v>1982</c:v>
+                  <c:v>1982.0</c:v>
                 </c:pt>
                 <c:pt idx="2">
-                  <c:v>626</c:v>
+                  <c:v>626.0</c:v>
                 </c:pt>
                 <c:pt idx="3">
-                  <c:v>696</c:v>
+                  <c:v>696.0</c:v>
                 </c:pt>
               </c:numCache>
             </c:numRef>
           </c:val>
-          <c:extLst>
+          <c:extLst xmlns:c16r2="http://schemas.microsoft.com/office/drawing/2015/06/chart">
             <c:ext xmlns:c16="http://schemas.microsoft.com/office/drawing/2014/chart" uri="{C3380CC4-5D6E-409C-BE32-E72D297353CC}">
               <c16:uniqueId val="{00000002-2C3D-4126-A442-3DDF71414ABF}"/>
             </c:ext>
@@ -785,8 +787,8 @@
               <c:idx val="0"/>
               <c:layout>
                 <c:manualLayout>
-                  <c:x val="0"/>
-                  <c:y val="-2.0785219399538101E-2"/>
+                  <c:x val="0.0"/>
+                  <c:y val="-0.0207852193995381"/>
                 </c:manualLayout>
               </c:layout>
               <c:showLegendKey val="0"/>
@@ -795,7 +797,7 @@
               <c:showSerName val="0"/>
               <c:showPercent val="0"/>
               <c:showBubbleSize val="0"/>
-              <c:extLst>
+              <c:extLst xmlns:c16r2="http://schemas.microsoft.com/office/drawing/2015/06/chart">
                 <c:ext xmlns:c15="http://schemas.microsoft.com/office/drawing/2012/chart" uri="{CE6537A1-D6FC-4f65-9D91-7224C49458BB}"/>
                 <c:ext xmlns:c16="http://schemas.microsoft.com/office/drawing/2014/chart" uri="{C3380CC4-5D6E-409C-BE32-E72D297353CC}">
                   <c16:uniqueId val="{00000003-2C3D-4126-A442-3DDF71414ABF}"/>
@@ -806,8 +808,8 @@
               <c:idx val="1"/>
               <c:layout>
                 <c:manualLayout>
-                  <c:x val="0"/>
-                  <c:y val="1.38568129330254E-2"/>
+                  <c:x val="0.0"/>
+                  <c:y val="0.0138568129330254"/>
                 </c:manualLayout>
               </c:layout>
               <c:showLegendKey val="0"/>
@@ -816,7 +818,7 @@
               <c:showSerName val="0"/>
               <c:showPercent val="0"/>
               <c:showBubbleSize val="0"/>
-              <c:extLst>
+              <c:extLst xmlns:c16r2="http://schemas.microsoft.com/office/drawing/2015/06/chart">
                 <c:ext xmlns:c15="http://schemas.microsoft.com/office/drawing/2012/chart" uri="{CE6537A1-D6FC-4f65-9D91-7224C49458BB}"/>
                 <c:ext xmlns:c16="http://schemas.microsoft.com/office/drawing/2014/chart" uri="{C3380CC4-5D6E-409C-BE32-E72D297353CC}">
                   <c16:uniqueId val="{00000004-2C3D-4126-A442-3DDF71414ABF}"/>
@@ -847,7 +849,7 @@
             <c:showPercent val="0"/>
             <c:showBubbleSize val="0"/>
             <c:showLeaderLines val="0"/>
-            <c:extLst>
+            <c:extLst xmlns:c16r2="http://schemas.microsoft.com/office/drawing/2015/06/chart">
               <c:ext xmlns:c15="http://schemas.microsoft.com/office/drawing/2012/chart" uri="{CE6537A1-D6FC-4f65-9D91-7224C49458BB}">
                 <c15:showLeaderLines val="0"/>
               </c:ext>
@@ -880,21 +882,21 @@
                 <c:formatCode>General</c:formatCode>
                 <c:ptCount val="4"/>
                 <c:pt idx="0">
-                  <c:v>1128</c:v>
+                  <c:v>1128.0</c:v>
                 </c:pt>
                 <c:pt idx="1">
-                  <c:v>1958</c:v>
+                  <c:v>1958.0</c:v>
                 </c:pt>
                 <c:pt idx="2">
-                  <c:v>626</c:v>
+                  <c:v>626.0</c:v>
                 </c:pt>
                 <c:pt idx="3">
-                  <c:v>696</c:v>
+                  <c:v>696.0</c:v>
                 </c:pt>
               </c:numCache>
             </c:numRef>
           </c:val>
-          <c:extLst>
+          <c:extLst xmlns:c16r2="http://schemas.microsoft.com/office/drawing/2015/06/chart">
             <c:ext xmlns:c16="http://schemas.microsoft.com/office/drawing/2014/chart" uri="{C3380CC4-5D6E-409C-BE32-E72D297353CC}">
               <c16:uniqueId val="{00000005-2C3D-4126-A442-3DDF71414ABF}"/>
             </c:ext>
@@ -940,7 +942,7 @@
             <c:showPercent val="0"/>
             <c:showBubbleSize val="0"/>
             <c:showLeaderLines val="0"/>
-            <c:extLst>
+            <c:extLst xmlns:c16r2="http://schemas.microsoft.com/office/drawing/2015/06/chart">
               <c:ext xmlns:c15="http://schemas.microsoft.com/office/drawing/2012/chart" uri="{CE6537A1-D6FC-4f65-9D91-7224C49458BB}">
                 <c15:showLeaderLines val="0"/>
               </c:ext>
@@ -973,21 +975,21 @@
                 <c:formatCode>General</c:formatCode>
                 <c:ptCount val="4"/>
                 <c:pt idx="0">
-                  <c:v>1372</c:v>
+                  <c:v>1372.0</c:v>
                 </c:pt>
                 <c:pt idx="1">
-                  <c:v>2422</c:v>
+                  <c:v>2422.0</c:v>
                 </c:pt>
                 <c:pt idx="2">
-                  <c:v>741</c:v>
+                  <c:v>741.0</c:v>
                 </c:pt>
                 <c:pt idx="3">
-                  <c:v>836</c:v>
+                  <c:v>836.0</c:v>
                 </c:pt>
               </c:numCache>
             </c:numRef>
           </c:val>
-          <c:extLst>
+          <c:extLst xmlns:c16r2="http://schemas.microsoft.com/office/drawing/2015/06/chart">
             <c:ext xmlns:c16="http://schemas.microsoft.com/office/drawing/2014/chart" uri="{C3380CC4-5D6E-409C-BE32-E72D297353CC}">
               <c16:uniqueId val="{00000006-2C3D-4126-A442-3DDF71414ABF}"/>
             </c:ext>
@@ -1002,11 +1004,11 @@
           <c:showBubbleSize val="0"/>
         </c:dLbls>
         <c:gapWidth val="150"/>
-        <c:axId val="288539832"/>
-        <c:axId val="329026520"/>
+        <c:axId val="2120509560"/>
+        <c:axId val="2120512648"/>
       </c:barChart>
       <c:catAx>
-        <c:axId val="288539832"/>
+        <c:axId val="2120509560"/>
         <c:scaling>
           <c:orientation val="minMax"/>
         </c:scaling>
@@ -1026,7 +1028,7 @@
             <a:endParaRPr lang="nl-NL"/>
           </a:p>
         </c:txPr>
-        <c:crossAx val="329026520"/>
+        <c:crossAx val="2120512648"/>
         <c:crosses val="autoZero"/>
         <c:auto val="1"/>
         <c:lblAlgn val="ctr"/>
@@ -1034,10 +1036,10 @@
         <c:noMultiLvlLbl val="0"/>
       </c:catAx>
       <c:valAx>
-        <c:axId val="329026520"/>
+        <c:axId val="2120512648"/>
         <c:scaling>
           <c:orientation val="minMax"/>
-          <c:max val="2500"/>
+          <c:max val="2500.0"/>
         </c:scaling>
         <c:delete val="0"/>
         <c:axPos val="l"/>
@@ -1058,19 +1060,21 @@
               </a:p>
             </c:rich>
           </c:tx>
+          <c:layout/>
           <c:overlay val="0"/>
         </c:title>
         <c:numFmt formatCode="General" sourceLinked="1"/>
         <c:majorTickMark val="out"/>
         <c:minorTickMark val="none"/>
         <c:tickLblPos val="nextTo"/>
-        <c:crossAx val="288539832"/>
+        <c:crossAx val="2120509560"/>
         <c:crosses val="autoZero"/>
         <c:crossBetween val="between"/>
       </c:valAx>
     </c:plotArea>
     <c:legend>
       <c:legendPos val="r"/>
+      <c:layout/>
       <c:overlay val="0"/>
       <c:txPr>
         <a:bodyPr/>
@@ -1175,7 +1179,7 @@
           <a:p>
             <a:fld id="{D9C73654-FA52-4E91-A6E4-53134F299D0C}" type="datetimeFigureOut">
               <a:rPr lang="nl-NL" smtClean="0"/>
-              <a:t>24-5-2016</a:t>
+              <a:t>25/05/16</a:t>
             </a:fld>
             <a:endParaRPr lang="nl-NL"/>
           </a:p>
@@ -1663,7 +1667,7 @@
           <a:p>
             <a:fld id="{24F91115-6E23-48A2-830D-2E349A7A41D4}" type="datetimeFigureOut">
               <a:rPr lang="nl-NL" smtClean="0"/>
-              <a:t>24-5-2016</a:t>
+              <a:t>25/05/16</a:t>
             </a:fld>
             <a:endParaRPr lang="nl-NL"/>
           </a:p>
@@ -1831,7 +1835,7 @@
           <a:p>
             <a:fld id="{24F91115-6E23-48A2-830D-2E349A7A41D4}" type="datetimeFigureOut">
               <a:rPr lang="nl-NL" smtClean="0"/>
-              <a:t>24-5-2016</a:t>
+              <a:t>25/05/16</a:t>
             </a:fld>
             <a:endParaRPr lang="nl-NL"/>
           </a:p>
@@ -2009,7 +2013,7 @@
           <a:p>
             <a:fld id="{24F91115-6E23-48A2-830D-2E349A7A41D4}" type="datetimeFigureOut">
               <a:rPr lang="nl-NL" smtClean="0"/>
-              <a:t>24-5-2016</a:t>
+              <a:t>25/05/16</a:t>
             </a:fld>
             <a:endParaRPr lang="nl-NL"/>
           </a:p>
@@ -2177,7 +2181,7 @@
           <a:p>
             <a:fld id="{24F91115-6E23-48A2-830D-2E349A7A41D4}" type="datetimeFigureOut">
               <a:rPr lang="nl-NL" smtClean="0"/>
-              <a:t>24-5-2016</a:t>
+              <a:t>25/05/16</a:t>
             </a:fld>
             <a:endParaRPr lang="nl-NL"/>
           </a:p>
@@ -2422,7 +2426,7 @@
           <a:p>
             <a:fld id="{24F91115-6E23-48A2-830D-2E349A7A41D4}" type="datetimeFigureOut">
               <a:rPr lang="nl-NL" smtClean="0"/>
-              <a:t>24-5-2016</a:t>
+              <a:t>25/05/16</a:t>
             </a:fld>
             <a:endParaRPr lang="nl-NL"/>
           </a:p>
@@ -2651,7 +2655,7 @@
           <a:p>
             <a:fld id="{24F91115-6E23-48A2-830D-2E349A7A41D4}" type="datetimeFigureOut">
               <a:rPr lang="nl-NL" smtClean="0"/>
-              <a:t>24-5-2016</a:t>
+              <a:t>25/05/16</a:t>
             </a:fld>
             <a:endParaRPr lang="nl-NL"/>
           </a:p>
@@ -3015,7 +3019,7 @@
           <a:p>
             <a:fld id="{24F91115-6E23-48A2-830D-2E349A7A41D4}" type="datetimeFigureOut">
               <a:rPr lang="nl-NL" smtClean="0"/>
-              <a:t>24-5-2016</a:t>
+              <a:t>25/05/16</a:t>
             </a:fld>
             <a:endParaRPr lang="nl-NL"/>
           </a:p>
@@ -3132,7 +3136,7 @@
           <a:p>
             <a:fld id="{24F91115-6E23-48A2-830D-2E349A7A41D4}" type="datetimeFigureOut">
               <a:rPr lang="nl-NL" smtClean="0"/>
-              <a:t>24-5-2016</a:t>
+              <a:t>25/05/16</a:t>
             </a:fld>
             <a:endParaRPr lang="nl-NL"/>
           </a:p>
@@ -3227,7 +3231,7 @@
           <a:p>
             <a:fld id="{24F91115-6E23-48A2-830D-2E349A7A41D4}" type="datetimeFigureOut">
               <a:rPr lang="nl-NL" smtClean="0"/>
-              <a:t>24-5-2016</a:t>
+              <a:t>25/05/16</a:t>
             </a:fld>
             <a:endParaRPr lang="nl-NL"/>
           </a:p>
@@ -3502,7 +3506,7 @@
           <a:p>
             <a:fld id="{24F91115-6E23-48A2-830D-2E349A7A41D4}" type="datetimeFigureOut">
               <a:rPr lang="nl-NL" smtClean="0"/>
-              <a:t>24-5-2016</a:t>
+              <a:t>25/05/16</a:t>
             </a:fld>
             <a:endParaRPr lang="nl-NL"/>
           </a:p>
@@ -3754,7 +3758,7 @@
           <a:p>
             <a:fld id="{24F91115-6E23-48A2-830D-2E349A7A41D4}" type="datetimeFigureOut">
               <a:rPr lang="nl-NL" smtClean="0"/>
-              <a:t>24-5-2016</a:t>
+              <a:t>25/05/16</a:t>
             </a:fld>
             <a:endParaRPr lang="nl-NL"/>
           </a:p>
@@ -3968,7 +3972,7 @@
           <a:p>
             <a:fld id="{24F91115-6E23-48A2-830D-2E349A7A41D4}" type="datetimeFigureOut">
               <a:rPr lang="nl-NL" smtClean="0"/>
-              <a:t>24-5-2016</a:t>
+              <a:t>25/05/16</a:t>
             </a:fld>
             <a:endParaRPr lang="nl-NL"/>
           </a:p>
@@ -4662,6 +4666,10 @@
             <a:pPr marL="0" indent="0">
               <a:buNone/>
             </a:pPr>
+            <a:r>
+              <a:rPr lang="nl-NL" dirty="0"/>
+              <a:t/>
+            </a:r>
             <a:br>
               <a:rPr lang="nl-NL" dirty="0"/>
             </a:br>
@@ -4714,21 +4722,21 @@
           <a:lstStyle/>
           <a:p>
             <a:r>
-              <a:rPr lang="nl-NL" u="sng" dirty="0"/>
-              <a:t>Resultaten opdracht 2: Rusland</a:t>
+              <a:rPr lang="nl-NL" u="sng" dirty="0" smtClean="0"/>
+              <a:t>RESULTATEN OPDRACHT 2: RUSLAND</a:t>
             </a:r>
             <a:br>
-              <a:rPr lang="nl-NL" u="sng" dirty="0"/>
+              <a:rPr lang="nl-NL" u="sng" dirty="0" smtClean="0"/>
             </a:br>
             <a:r>
-              <a:rPr lang="nl-NL" dirty="0"/>
+              <a:rPr lang="nl-NL" dirty="0" smtClean="0"/>
               <a:t>					</a:t>
             </a:r>
             <a:br>
-              <a:rPr lang="nl-NL" dirty="0"/>
+              <a:rPr lang="nl-NL" dirty="0" smtClean="0"/>
             </a:br>
             <a:r>
-              <a:rPr lang="nl-NL" dirty="0"/>
+              <a:rPr lang="nl-NL" dirty="0" smtClean="0"/>
               <a:t>					</a:t>
             </a:r>
             <a:endParaRPr lang="nl-NL" sz="3200" dirty="0"/>
@@ -4751,8 +4759,8 @@
         </p:blipFill>
         <p:spPr>
           <a:xfrm>
-            <a:off x="1813502" y="1621056"/>
-            <a:ext cx="8608360" cy="4164157"/>
+            <a:off x="727513" y="1485437"/>
+            <a:ext cx="10727727" cy="5189368"/>
           </a:xfrm>
           <a:prstGeom prst="rect">
             <a:avLst/>
@@ -4805,8 +4813,8 @@
           <a:lstStyle/>
           <a:p>
             <a:r>
-              <a:rPr lang="nl-NL" u="sng" dirty="0"/>
-              <a:t>Resultaten opdracht 2: Rusland</a:t>
+              <a:rPr lang="nl-NL" u="sng" dirty="0" smtClean="0"/>
+              <a:t>RESULTATEN OPDRACHT 2: RUSLAND</a:t>
             </a:r>
             <a:endParaRPr lang="nl-NL" dirty="0"/>
           </a:p>
@@ -4841,28 +4849,28 @@
                 <a:gridCol w="2628900">
                   <a:extLst>
                     <a:ext uri="{9D8B030D-6E8A-4147-A177-3AD203B41FA5}">
-                      <a16:colId xmlns:a16="http://schemas.microsoft.com/office/drawing/2014/main" val="3306067407"/>
+                      <a16:colId xmlns:a16="http://schemas.microsoft.com/office/drawing/2014/main" xmlns="" val="3306067407"/>
                     </a:ext>
                   </a:extLst>
                 </a:gridCol>
                 <a:gridCol w="2628900">
                   <a:extLst>
                     <a:ext uri="{9D8B030D-6E8A-4147-A177-3AD203B41FA5}">
-                      <a16:colId xmlns:a16="http://schemas.microsoft.com/office/drawing/2014/main" val="219582485"/>
+                      <a16:colId xmlns:a16="http://schemas.microsoft.com/office/drawing/2014/main" xmlns="" val="219582485"/>
                     </a:ext>
                   </a:extLst>
                 </a:gridCol>
                 <a:gridCol w="2628900">
                   <a:extLst>
                     <a:ext uri="{9D8B030D-6E8A-4147-A177-3AD203B41FA5}">
-                      <a16:colId xmlns:a16="http://schemas.microsoft.com/office/drawing/2014/main" val="397432196"/>
+                      <a16:colId xmlns:a16="http://schemas.microsoft.com/office/drawing/2014/main" xmlns="" val="397432196"/>
                     </a:ext>
                   </a:extLst>
                 </a:gridCol>
                 <a:gridCol w="2628900">
                   <a:extLst>
                     <a:ext uri="{9D8B030D-6E8A-4147-A177-3AD203B41FA5}">
-                      <a16:colId xmlns:a16="http://schemas.microsoft.com/office/drawing/2014/main" val="862735919"/>
+                      <a16:colId xmlns:a16="http://schemas.microsoft.com/office/drawing/2014/main" xmlns="" val="862735919"/>
                     </a:ext>
                   </a:extLst>
                 </a:gridCol>
@@ -4950,7 +4958,7 @@
                 </a:tc>
                 <a:extLst>
                   <a:ext uri="{0D108BD9-81ED-4DB2-BD59-A6C34878D82A}">
-                    <a16:rowId xmlns:a16="http://schemas.microsoft.com/office/drawing/2014/main" val="567372543"/>
+                    <a16:rowId xmlns:a16="http://schemas.microsoft.com/office/drawing/2014/main" xmlns="" val="567372543"/>
                   </a:ext>
                 </a:extLst>
               </a:tr>
@@ -5009,7 +5017,7 @@
                 </a:tc>
                 <a:extLst>
                   <a:ext uri="{0D108BD9-81ED-4DB2-BD59-A6C34878D82A}">
-                    <a16:rowId xmlns:a16="http://schemas.microsoft.com/office/drawing/2014/main" val="2299440935"/>
+                    <a16:rowId xmlns:a16="http://schemas.microsoft.com/office/drawing/2014/main" xmlns="" val="2299440935"/>
                   </a:ext>
                 </a:extLst>
               </a:tr>
@@ -5068,7 +5076,7 @@
                 </a:tc>
                 <a:extLst>
                   <a:ext uri="{0D108BD9-81ED-4DB2-BD59-A6C34878D82A}">
-                    <a16:rowId xmlns:a16="http://schemas.microsoft.com/office/drawing/2014/main" val="1632698347"/>
+                    <a16:rowId xmlns:a16="http://schemas.microsoft.com/office/drawing/2014/main" xmlns="" val="1632698347"/>
                   </a:ext>
                 </a:extLst>
               </a:tr>
@@ -5127,7 +5135,7 @@
                 </a:tc>
                 <a:extLst>
                   <a:ext uri="{0D108BD9-81ED-4DB2-BD59-A6C34878D82A}">
-                    <a16:rowId xmlns:a16="http://schemas.microsoft.com/office/drawing/2014/main" val="1473007227"/>
+                    <a16:rowId xmlns:a16="http://schemas.microsoft.com/office/drawing/2014/main" xmlns="" val="1473007227"/>
                   </a:ext>
                 </a:extLst>
               </a:tr>
@@ -5195,28 +5203,28 @@
                 <a:gridCol w="2628900">
                   <a:extLst>
                     <a:ext uri="{9D8B030D-6E8A-4147-A177-3AD203B41FA5}">
-                      <a16:colId xmlns:a16="http://schemas.microsoft.com/office/drawing/2014/main" val="3306067407"/>
+                      <a16:colId xmlns:a16="http://schemas.microsoft.com/office/drawing/2014/main" xmlns="" val="3306067407"/>
                     </a:ext>
                   </a:extLst>
                 </a:gridCol>
                 <a:gridCol w="2628900">
                   <a:extLst>
                     <a:ext uri="{9D8B030D-6E8A-4147-A177-3AD203B41FA5}">
-                      <a16:colId xmlns:a16="http://schemas.microsoft.com/office/drawing/2014/main" val="219582485"/>
+                      <a16:colId xmlns:a16="http://schemas.microsoft.com/office/drawing/2014/main" xmlns="" val="219582485"/>
                     </a:ext>
                   </a:extLst>
                 </a:gridCol>
                 <a:gridCol w="2628900">
                   <a:extLst>
                     <a:ext uri="{9D8B030D-6E8A-4147-A177-3AD203B41FA5}">
-                      <a16:colId xmlns:a16="http://schemas.microsoft.com/office/drawing/2014/main" val="397432196"/>
+                      <a16:colId xmlns:a16="http://schemas.microsoft.com/office/drawing/2014/main" xmlns="" val="397432196"/>
                     </a:ext>
                   </a:extLst>
                 </a:gridCol>
                 <a:gridCol w="2628900">
                   <a:extLst>
                     <a:ext uri="{9D8B030D-6E8A-4147-A177-3AD203B41FA5}">
-                      <a16:colId xmlns:a16="http://schemas.microsoft.com/office/drawing/2014/main" val="862735919"/>
+                      <a16:colId xmlns:a16="http://schemas.microsoft.com/office/drawing/2014/main" xmlns="" val="862735919"/>
                     </a:ext>
                   </a:extLst>
                 </a:gridCol>
@@ -5304,7 +5312,7 @@
                 </a:tc>
                 <a:extLst>
                   <a:ext uri="{0D108BD9-81ED-4DB2-BD59-A6C34878D82A}">
-                    <a16:rowId xmlns:a16="http://schemas.microsoft.com/office/drawing/2014/main" val="567372543"/>
+                    <a16:rowId xmlns:a16="http://schemas.microsoft.com/office/drawing/2014/main" xmlns="" val="567372543"/>
                   </a:ext>
                 </a:extLst>
               </a:tr>
@@ -5360,7 +5368,7 @@
                 </a:tc>
                 <a:extLst>
                   <a:ext uri="{0D108BD9-81ED-4DB2-BD59-A6C34878D82A}">
-                    <a16:rowId xmlns:a16="http://schemas.microsoft.com/office/drawing/2014/main" val="2299440935"/>
+                    <a16:rowId xmlns:a16="http://schemas.microsoft.com/office/drawing/2014/main" xmlns="" val="2299440935"/>
                   </a:ext>
                 </a:extLst>
               </a:tr>
@@ -5416,7 +5424,7 @@
                 </a:tc>
                 <a:extLst>
                   <a:ext uri="{0D108BD9-81ED-4DB2-BD59-A6C34878D82A}">
-                    <a16:rowId xmlns:a16="http://schemas.microsoft.com/office/drawing/2014/main" val="1632698347"/>
+                    <a16:rowId xmlns:a16="http://schemas.microsoft.com/office/drawing/2014/main" xmlns="" val="1632698347"/>
                   </a:ext>
                 </a:extLst>
               </a:tr>
@@ -5472,7 +5480,7 @@
                 </a:tc>
                 <a:extLst>
                   <a:ext uri="{0D108BD9-81ED-4DB2-BD59-A6C34878D82A}">
-                    <a16:rowId xmlns:a16="http://schemas.microsoft.com/office/drawing/2014/main" val="1473007227"/>
+                    <a16:rowId xmlns:a16="http://schemas.microsoft.com/office/drawing/2014/main" xmlns="" val="1473007227"/>
                   </a:ext>
                 </a:extLst>
               </a:tr>
@@ -5571,6 +5579,10 @@
             <a:pPr marL="0" indent="0">
               <a:buNone/>
             </a:pPr>
+            <a:r>
+              <a:rPr lang="nl-NL" dirty="0"/>
+              <a:t/>
+            </a:r>
             <a:br>
               <a:rPr lang="nl-NL" dirty="0"/>
             </a:br>
@@ -5672,9 +5684,10 @@
           <a:lstStyle/>
           <a:p>
             <a:r>
-              <a:rPr lang="nl-NL" u="sng" dirty="0"/>
-              <a:t>Conclusies</a:t>
-            </a:r>
+              <a:rPr lang="nl-NL" u="sng" dirty="0" smtClean="0"/>
+              <a:t>CONCLUSIES</a:t>
+            </a:r>
+            <a:endParaRPr lang="nl-NL" u="sng" dirty="0"/>
           </a:p>
         </p:txBody>
       </p:sp>
@@ -5702,8 +5715,13 @@
           <a:p>
             <a:r>
               <a:rPr lang="nl-NL" dirty="0"/>
-              <a:t>Probleem 1: </a:t>
-            </a:r>
+              <a:t>Probleem </a:t>
+            </a:r>
+            <a:r>
+              <a:rPr lang="nl-NL" dirty="0" smtClean="0"/>
+              <a:t>1</a:t>
+            </a:r>
+            <a:endParaRPr lang="nl-NL" dirty="0"/>
           </a:p>
           <a:p>
             <a:pPr lvl="1"/>
@@ -5799,6 +5817,30 @@
           </a:p>
         </p:txBody>
       </p:sp>
+      <p:pic>
+        <p:nvPicPr>
+          <p:cNvPr id="4" name="Afbeelding 3"/>
+          <p:cNvPicPr>
+            <a:picLocks noChangeAspect="1"/>
+          </p:cNvPicPr>
+          <p:nvPr/>
+        </p:nvPicPr>
+        <p:blipFill>
+          <a:blip r:embed="rId2"/>
+          <a:stretch>
+            <a:fillRect/>
+          </a:stretch>
+        </p:blipFill>
+        <p:spPr>
+          <a:xfrm>
+            <a:off x="9757833" y="304114"/>
+            <a:ext cx="2434167" cy="1120099"/>
+          </a:xfrm>
+          <a:prstGeom prst="rect">
+            <a:avLst/>
+          </a:prstGeom>
+        </p:spPr>
+      </p:pic>
     </p:spTree>
     <p:extLst>
       <p:ext uri="{BB962C8B-B14F-4D97-AF65-F5344CB8AC3E}">
@@ -5953,6 +5995,10 @@
             <a:pPr marL="0" indent="0">
               <a:buNone/>
             </a:pPr>
+            <a:r>
+              <a:rPr lang="nl-NL" dirty="0"/>
+              <a:t/>
+            </a:r>
             <a:br>
               <a:rPr lang="nl-NL" dirty="0"/>
             </a:br>
@@ -6788,9 +6834,10 @@
               <a:buChar char="Ø"/>
             </a:pPr>
             <a:r>
-              <a:rPr lang="nl-NL" dirty="0"/>
-              <a:t>Vierkleurenprobleem</a:t>
-            </a:r>
+              <a:rPr lang="nl-NL" dirty="0" smtClean="0"/>
+              <a:t> Vierkleurenprobleem</a:t>
+            </a:r>
+            <a:endParaRPr lang="nl-NL" dirty="0"/>
           </a:p>
           <a:p>
             <a:pPr lvl="1">
@@ -6808,8 +6855,12 @@
               <a:buChar char="Ø"/>
             </a:pPr>
             <a:r>
+              <a:rPr lang="nl-NL" dirty="0" smtClean="0"/>
+              <a:t> Bij </a:t>
+            </a:r>
+            <a:r>
               <a:rPr lang="nl-NL" dirty="0"/>
-              <a:t>Bij alle oplossingen kan iedere zendertype in zijn geheel ook een ander zendertype zijn </a:t>
+              <a:t>alle oplossingen kan iedere zendertype in zijn geheel ook een ander zendertype zijn </a:t>
             </a:r>
           </a:p>
           <a:p>
@@ -7061,6 +7112,10 @@
             <a:pPr marL="0" indent="0">
               <a:buNone/>
             </a:pPr>
+            <a:r>
+              <a:rPr lang="nl-NL" dirty="0"/>
+              <a:t/>
+            </a:r>
             <a:br>
               <a:rPr lang="nl-NL" dirty="0"/>
             </a:br>
@@ -7154,6 +7209,10 @@
             <a:pPr marL="0" indent="0">
               <a:buNone/>
             </a:pPr>
+            <a:r>
+              <a:rPr lang="nl-NL" dirty="0"/>
+              <a:t/>
+            </a:r>
             <a:br>
               <a:rPr lang="nl-NL" dirty="0"/>
             </a:br>
@@ -7303,9 +7362,10 @@
           <a:lstStyle/>
           <a:p>
             <a:r>
-              <a:rPr lang="nl-NL" u="sng" dirty="0"/>
-              <a:t>Opdracht 2: Goedkoopste verdeling</a:t>
-            </a:r>
+              <a:rPr lang="nl-NL" u="sng" dirty="0" smtClean="0"/>
+              <a:t>OPDRACHT 2: GOEDKOOPSTE VERDELING</a:t>
+            </a:r>
+            <a:endParaRPr lang="nl-NL" u="sng" dirty="0"/>
           </a:p>
         </p:txBody>
       </p:sp>
@@ -7335,8 +7395,12 @@
               <a:buChar char="Ø"/>
             </a:pPr>
             <a:r>
+              <a:rPr lang="nl-NL" dirty="0" smtClean="0"/>
+              <a:t> 7</a:t>
+            </a:r>
+            <a:r>
               <a:rPr lang="nl-NL" dirty="0"/>
-              <a:t>7^82 = 1.99*10^69</a:t>
+              <a:t>^82 = 1.99*10^69</a:t>
             </a:r>
           </a:p>
           <a:p>
@@ -7374,6 +7438,30 @@
           <a:xfrm>
             <a:off x="6943725" y="1825625"/>
             <a:ext cx="4410075" cy="3152775"/>
+          </a:xfrm>
+          <a:prstGeom prst="rect">
+            <a:avLst/>
+          </a:prstGeom>
+        </p:spPr>
+      </p:pic>
+      <p:pic>
+        <p:nvPicPr>
+          <p:cNvPr id="5" name="Afbeelding 4"/>
+          <p:cNvPicPr>
+            <a:picLocks noChangeAspect="1"/>
+          </p:cNvPicPr>
+          <p:nvPr/>
+        </p:nvPicPr>
+        <p:blipFill>
+          <a:blip r:embed="rId3"/>
+          <a:stretch>
+            <a:fillRect/>
+          </a:stretch>
+        </p:blipFill>
+        <p:spPr>
+          <a:xfrm>
+            <a:off x="9757833" y="304114"/>
+            <a:ext cx="2434167" cy="1120099"/>
           </a:xfrm>
           <a:prstGeom prst="rect">
             <a:avLst/>
@@ -7473,7 +7561,15 @@
             </a:pPr>
             <a:r>
               <a:rPr lang="nl-NL" dirty="0"/>
-              <a:t>  Random sampling</a:t>
+              <a:t> </a:t>
+            </a:r>
+            <a:r>
+              <a:rPr lang="nl-NL" dirty="0" smtClean="0"/>
+              <a:t>Random </a:t>
+            </a:r>
+            <a:r>
+              <a:rPr lang="nl-NL" dirty="0"/>
+              <a:t>sampling</a:t>
             </a:r>
           </a:p>
           <a:p>
@@ -7555,6 +7651,10 @@
             <a:pPr marL="0" indent="0">
               <a:buNone/>
             </a:pPr>
+            <a:r>
+              <a:rPr lang="nl-NL" dirty="0"/>
+              <a:t/>
+            </a:r>
             <a:br>
               <a:rPr lang="nl-NL" dirty="0"/>
             </a:br>
@@ -7912,7 +8012,7 @@
   <a:extraClrSchemeLst/>
   <a:extLst>
     <a:ext uri="{05A4C25C-085E-4340-85A3-A5531E510DB2}">
-      <thm15:themeFamily xmlns:thm15="http://schemas.microsoft.com/office/thememl/2012/main" name="Office Theme" id="{62F939B6-93AF-4DB8-9C6B-D6C7DFDC589F}" vid="{4A3C46E8-61CC-4603-A589-7422A47A8E4A}"/>
+      <thm15:themeFamily xmlns:thm15="http://schemas.microsoft.com/office/thememl/2012/main" xmlns="" name="Office Theme" id="{62F939B6-93AF-4DB8-9C6B-D6C7DFDC589F}" vid="{4A3C46E8-61CC-4603-A589-7422A47A8E4A}"/>
     </a:ext>
   </a:extLst>
 </a:theme>
@@ -7961,7 +8061,7 @@
     </a:clrScheme>
     <a:fontScheme name="Kantoor">
       <a:majorFont>
-        <a:latin typeface="Calibri Light" panose="020F0302020204030204"/>
+        <a:latin typeface="Calibri Light"/>
         <a:ea typeface=""/>
         <a:cs typeface=""/>
         <a:font script="Jpan" typeface="游ゴシック Light"/>
@@ -8013,7 +8113,7 @@
         <a:font script="Tfng" typeface="Ebrima"/>
       </a:majorFont>
       <a:minorFont>
-        <a:latin typeface="Calibri" panose="020F0502020204030204"/>
+        <a:latin typeface="Calibri"/>
         <a:ea typeface=""/>
         <a:cs typeface=""/>
         <a:font script="Jpan" typeface="游ゴシック"/>
@@ -8207,7 +8307,7 @@
   <a:extraClrSchemeLst/>
   <a:extLst>
     <a:ext uri="{05A4C25C-085E-4340-85A3-A5531E510DB2}">
-      <thm15:themeFamily xmlns:thm15="http://schemas.microsoft.com/office/thememl/2012/main" name="Office Theme" id="{62F939B6-93AF-4DB8-9C6B-D6C7DFDC589F}" vid="{4A3C46E8-61CC-4603-A589-7422A47A8E4A}"/>
+      <thm15:themeFamily xmlns:thm15="http://schemas.microsoft.com/office/thememl/2012/main" xmlns="" name="Office Theme" id="{62F939B6-93AF-4DB8-9C6B-D6C7DFDC589F}" vid="{4A3C46E8-61CC-4603-A589-7422A47A8E4A}"/>
     </a:ext>
   </a:extLst>
 </a:theme>

</xml_diff>